<commit_message>
use gif for pub images
</commit_message>
<xml_diff>
--- a/assets/genre.pptx
+++ b/assets/genre.pptx
@@ -6,6 +6,7 @@
   </p:sldMasterIdLst>
   <p:sldIdLst>
     <p:sldId id="260" r:id="rId2"/>
+    <p:sldId id="261" r:id="rId3"/>
   </p:sldIdLst>
   <p:sldSz cx="35999738" cy="20880388"/>
   <p:notesSz cx="6858000" cy="9144000"/>
@@ -243,7 +244,7 @@
           <a:p>
             <a:fld id="{8331277A-F8D7-CA41-9C61-B26EF9DEDFA8}" type="datetimeFigureOut">
               <a:rPr lang="en-US" smtClean="0"/>
-              <a:t>11/23/18</a:t>
+              <a:t>5/23/20</a:t>
             </a:fld>
             <a:endParaRPr lang="en-US"/>
           </a:p>
@@ -408,7 +409,7 @@
           <a:p>
             <a:fld id="{8331277A-F8D7-CA41-9C61-B26EF9DEDFA8}" type="datetimeFigureOut">
               <a:rPr lang="en-US" smtClean="0"/>
-              <a:t>11/23/18</a:t>
+              <a:t>5/23/20</a:t>
             </a:fld>
             <a:endParaRPr lang="en-US"/>
           </a:p>
@@ -583,7 +584,7 @@
           <a:p>
             <a:fld id="{8331277A-F8D7-CA41-9C61-B26EF9DEDFA8}" type="datetimeFigureOut">
               <a:rPr lang="en-US" smtClean="0"/>
-              <a:t>11/23/18</a:t>
+              <a:t>5/23/20</a:t>
             </a:fld>
             <a:endParaRPr lang="en-US"/>
           </a:p>
@@ -748,7 +749,7 @@
           <a:p>
             <a:fld id="{8331277A-F8D7-CA41-9C61-B26EF9DEDFA8}" type="datetimeFigureOut">
               <a:rPr lang="en-US" smtClean="0"/>
-              <a:t>11/23/18</a:t>
+              <a:t>5/23/20</a:t>
             </a:fld>
             <a:endParaRPr lang="en-US"/>
           </a:p>
@@ -989,7 +990,7 @@
           <a:p>
             <a:fld id="{8331277A-F8D7-CA41-9C61-B26EF9DEDFA8}" type="datetimeFigureOut">
               <a:rPr lang="en-US" smtClean="0"/>
-              <a:t>11/23/18</a:t>
+              <a:t>5/23/20</a:t>
             </a:fld>
             <a:endParaRPr lang="en-US"/>
           </a:p>
@@ -1216,7 +1217,7 @@
           <a:p>
             <a:fld id="{8331277A-F8D7-CA41-9C61-B26EF9DEDFA8}" type="datetimeFigureOut">
               <a:rPr lang="en-US" smtClean="0"/>
-              <a:t>11/23/18</a:t>
+              <a:t>5/23/20</a:t>
             </a:fld>
             <a:endParaRPr lang="en-US"/>
           </a:p>
@@ -1578,7 +1579,7 @@
           <a:p>
             <a:fld id="{8331277A-F8D7-CA41-9C61-B26EF9DEDFA8}" type="datetimeFigureOut">
               <a:rPr lang="en-US" smtClean="0"/>
-              <a:t>11/23/18</a:t>
+              <a:t>5/23/20</a:t>
             </a:fld>
             <a:endParaRPr lang="en-US"/>
           </a:p>
@@ -1691,7 +1692,7 @@
           <a:p>
             <a:fld id="{8331277A-F8D7-CA41-9C61-B26EF9DEDFA8}" type="datetimeFigureOut">
               <a:rPr lang="en-US" smtClean="0"/>
-              <a:t>11/23/18</a:t>
+              <a:t>5/23/20</a:t>
             </a:fld>
             <a:endParaRPr lang="en-US"/>
           </a:p>
@@ -1781,7 +1782,7 @@
           <a:p>
             <a:fld id="{8331277A-F8D7-CA41-9C61-B26EF9DEDFA8}" type="datetimeFigureOut">
               <a:rPr lang="en-US" smtClean="0"/>
-              <a:t>11/23/18</a:t>
+              <a:t>5/23/20</a:t>
             </a:fld>
             <a:endParaRPr lang="en-US"/>
           </a:p>
@@ -2053,7 +2054,7 @@
           <a:p>
             <a:fld id="{8331277A-F8D7-CA41-9C61-B26EF9DEDFA8}" type="datetimeFigureOut">
               <a:rPr lang="en-US" smtClean="0"/>
-              <a:t>11/23/18</a:t>
+              <a:t>5/23/20</a:t>
             </a:fld>
             <a:endParaRPr lang="en-US"/>
           </a:p>
@@ -2305,7 +2306,7 @@
           <a:p>
             <a:fld id="{8331277A-F8D7-CA41-9C61-B26EF9DEDFA8}" type="datetimeFigureOut">
               <a:rPr lang="en-US" smtClean="0"/>
-              <a:t>11/23/18</a:t>
+              <a:t>5/23/20</a:t>
             </a:fld>
             <a:endParaRPr lang="en-US"/>
           </a:p>
@@ -2513,7 +2514,7 @@
           <a:p>
             <a:fld id="{8331277A-F8D7-CA41-9C61-B26EF9DEDFA8}" type="datetimeFigureOut">
               <a:rPr lang="en-US" smtClean="0"/>
-              <a:t>11/23/18</a:t>
+              <a:t>5/23/20</a:t>
             </a:fld>
             <a:endParaRPr lang="en-US"/>
           </a:p>
@@ -2920,6 +2921,376 @@
       </p:grpSpPr>
       <p:sp>
         <p:nvSpPr>
+          <p:cNvPr id="2" name="Rectangle 1">
+            <a:extLst>
+              <a:ext uri="{FF2B5EF4-FFF2-40B4-BE49-F238E27FC236}">
+                <a16:creationId xmlns:a16="http://schemas.microsoft.com/office/drawing/2014/main" id="{593B13F6-4F46-F746-92E9-1FE7CA2DE80D}"/>
+              </a:ext>
+            </a:extLst>
+          </p:cNvPr>
+          <p:cNvSpPr/>
+          <p:nvPr/>
+        </p:nvSpPr>
+        <p:spPr>
+          <a:xfrm>
+            <a:off x="7644385" y="1192695"/>
+            <a:ext cx="4901184" cy="6635226"/>
+          </a:xfrm>
+          <a:prstGeom prst="rect">
+            <a:avLst/>
+          </a:prstGeom>
+          <a:solidFill>
+            <a:schemeClr val="bg1"/>
+          </a:solidFill>
+          <a:ln>
+            <a:noFill/>
+          </a:ln>
+        </p:spPr>
+        <p:style>
+          <a:lnRef idx="2">
+            <a:schemeClr val="accent1">
+              <a:shade val="50000"/>
+            </a:schemeClr>
+          </a:lnRef>
+          <a:fillRef idx="1">
+            <a:schemeClr val="accent1"/>
+          </a:fillRef>
+          <a:effectRef idx="0">
+            <a:schemeClr val="accent1"/>
+          </a:effectRef>
+          <a:fontRef idx="minor">
+            <a:schemeClr val="lt1"/>
+          </a:fontRef>
+        </p:style>
+        <p:txBody>
+          <a:bodyPr rtlCol="0" anchor="ctr"/>
+          <a:lstStyle/>
+          <a:p>
+            <a:pPr algn="ctr"/>
+            <a:endParaRPr lang="en-US"/>
+          </a:p>
+        </p:txBody>
+      </p:sp>
+      <p:pic>
+        <p:nvPicPr>
+          <p:cNvPr id="71" name="Picture 70">
+            <a:extLst>
+              <a:ext uri="{FF2B5EF4-FFF2-40B4-BE49-F238E27FC236}">
+                <a16:creationId xmlns:a16="http://schemas.microsoft.com/office/drawing/2014/main" id="{CA885451-FD33-9A47-A5D8-71588E826B88}"/>
+              </a:ext>
+            </a:extLst>
+          </p:cNvPr>
+          <p:cNvPicPr>
+            <a:picLocks noChangeAspect="1"/>
+          </p:cNvPicPr>
+          <p:nvPr/>
+        </p:nvPicPr>
+        <p:blipFill rotWithShape="1">
+          <a:blip r:embed="rId2"/>
+          <a:srcRect l="14136" t="18716"/>
+          <a:stretch/>
+        </p:blipFill>
+        <p:spPr>
+          <a:xfrm>
+            <a:off x="7647717" y="1192696"/>
+            <a:ext cx="4900400" cy="4639023"/>
+          </a:xfrm>
+          <a:prstGeom prst="rect">
+            <a:avLst/>
+          </a:prstGeom>
+        </p:spPr>
+      </p:pic>
+      <p:pic>
+        <p:nvPicPr>
+          <p:cNvPr id="110" name="Picture 109">
+            <a:extLst>
+              <a:ext uri="{FF2B5EF4-FFF2-40B4-BE49-F238E27FC236}">
+                <a16:creationId xmlns:a16="http://schemas.microsoft.com/office/drawing/2014/main" id="{0824BBB8-FD93-8E46-8489-3E0DDE29CC1E}"/>
+              </a:ext>
+            </a:extLst>
+          </p:cNvPr>
+          <p:cNvPicPr>
+            <a:picLocks noChangeAspect="1"/>
+          </p:cNvPicPr>
+          <p:nvPr/>
+        </p:nvPicPr>
+        <p:blipFill rotWithShape="1">
+          <a:blip r:embed="rId3">
+            <a:extLst>
+              <a:ext uri="{BEBA8EAE-BF5A-486C-A8C5-ECC9F3942E4B}">
+                <a14:imgProps xmlns:a14="http://schemas.microsoft.com/office/drawing/2010/main">
+                  <a14:imgLayer r:embed="rId4">
+                    <a14:imgEffect>
+                      <a14:backgroundRemoval t="10000" b="90000" l="10000" r="90000"/>
+                    </a14:imgEffect>
+                  </a14:imgLayer>
+                </a14:imgProps>
+              </a:ext>
+            </a:extLst>
+          </a:blip>
+          <a:srcRect l="11084" t="23851" r="17921" b="24234"/>
+          <a:stretch/>
+        </p:blipFill>
+        <p:spPr>
+          <a:xfrm>
+            <a:off x="7647716" y="3833678"/>
+            <a:ext cx="4897069" cy="3580963"/>
+          </a:xfrm>
+          <a:prstGeom prst="rect">
+            <a:avLst/>
+          </a:prstGeom>
+        </p:spPr>
+      </p:pic>
+      <p:sp>
+        <p:nvSpPr>
+          <p:cNvPr id="20" name="TextBox 19">
+            <a:extLst>
+              <a:ext uri="{FF2B5EF4-FFF2-40B4-BE49-F238E27FC236}">
+                <a16:creationId xmlns:a16="http://schemas.microsoft.com/office/drawing/2014/main" id="{08B1E0BD-CE33-2D4B-B652-1DACC548B9FA}"/>
+              </a:ext>
+            </a:extLst>
+          </p:cNvPr>
+          <p:cNvSpPr txBox="1"/>
+          <p:nvPr/>
+        </p:nvSpPr>
+        <p:spPr>
+          <a:xfrm>
+            <a:off x="9431975" y="6980777"/>
+            <a:ext cx="1326004" cy="646331"/>
+          </a:xfrm>
+          <a:prstGeom prst="rect">
+            <a:avLst/>
+          </a:prstGeom>
+          <a:noFill/>
+        </p:spPr>
+        <p:txBody>
+          <a:bodyPr wrap="none" rtlCol="0">
+            <a:spAutoFit/>
+          </a:bodyPr>
+          <a:lstStyle/>
+          <a:p>
+            <a:r>
+              <a:rPr lang="en-US" sz="3600" dirty="0">
+                <a:latin typeface="Open Sans" panose="020B0606030504020204" pitchFamily="34" charset="0"/>
+                <a:ea typeface="Open Sans" panose="020B0606030504020204" pitchFamily="34" charset="0"/>
+                <a:cs typeface="Open Sans" panose="020B0606030504020204" pitchFamily="34" charset="0"/>
+              </a:rPr>
+              <a:t>Input</a:t>
+            </a:r>
+          </a:p>
+        </p:txBody>
+      </p:sp>
+      <p:sp>
+        <p:nvSpPr>
+          <p:cNvPr id="17" name="Rectangle 16">
+            <a:extLst>
+              <a:ext uri="{FF2B5EF4-FFF2-40B4-BE49-F238E27FC236}">
+                <a16:creationId xmlns:a16="http://schemas.microsoft.com/office/drawing/2014/main" id="{7F8CA6A9-4E13-434E-8FD5-2DD5623C8B17}"/>
+              </a:ext>
+            </a:extLst>
+          </p:cNvPr>
+          <p:cNvSpPr/>
+          <p:nvPr/>
+        </p:nvSpPr>
+        <p:spPr>
+          <a:xfrm>
+            <a:off x="14912479" y="1192695"/>
+            <a:ext cx="4901184" cy="6635226"/>
+          </a:xfrm>
+          <a:prstGeom prst="rect">
+            <a:avLst/>
+          </a:prstGeom>
+          <a:solidFill>
+            <a:schemeClr val="bg1"/>
+          </a:solidFill>
+          <a:ln>
+            <a:noFill/>
+          </a:ln>
+        </p:spPr>
+        <p:style>
+          <a:lnRef idx="2">
+            <a:schemeClr val="accent1">
+              <a:shade val="50000"/>
+            </a:schemeClr>
+          </a:lnRef>
+          <a:fillRef idx="1">
+            <a:schemeClr val="accent1"/>
+          </a:fillRef>
+          <a:effectRef idx="0">
+            <a:schemeClr val="accent1"/>
+          </a:effectRef>
+          <a:fontRef idx="minor">
+            <a:schemeClr val="lt1"/>
+          </a:fontRef>
+        </p:style>
+        <p:txBody>
+          <a:bodyPr rtlCol="0" anchor="ctr"/>
+          <a:lstStyle/>
+          <a:p>
+            <a:pPr algn="ctr"/>
+            <a:endParaRPr lang="en-US"/>
+          </a:p>
+        </p:txBody>
+      </p:sp>
+      <p:sp>
+        <p:nvSpPr>
+          <p:cNvPr id="21" name="TextBox 20">
+            <a:extLst>
+              <a:ext uri="{FF2B5EF4-FFF2-40B4-BE49-F238E27FC236}">
+                <a16:creationId xmlns:a16="http://schemas.microsoft.com/office/drawing/2014/main" id="{5F9C79E8-9B92-7B42-9E79-3E9C8A241805}"/>
+              </a:ext>
+            </a:extLst>
+          </p:cNvPr>
+          <p:cNvSpPr txBox="1"/>
+          <p:nvPr/>
+        </p:nvSpPr>
+        <p:spPr>
+          <a:xfrm>
+            <a:off x="16502899" y="6996924"/>
+            <a:ext cx="1720343" cy="646331"/>
+          </a:xfrm>
+          <a:prstGeom prst="rect">
+            <a:avLst/>
+          </a:prstGeom>
+          <a:noFill/>
+        </p:spPr>
+        <p:txBody>
+          <a:bodyPr wrap="none" rtlCol="0">
+            <a:spAutoFit/>
+          </a:bodyPr>
+          <a:lstStyle/>
+          <a:p>
+            <a:r>
+              <a:rPr lang="en-US" sz="3600" dirty="0">
+                <a:latin typeface="Open Sans" panose="020B0606030504020204" pitchFamily="34" charset="0"/>
+                <a:ea typeface="Open Sans" panose="020B0606030504020204" pitchFamily="34" charset="0"/>
+                <a:cs typeface="Open Sans" panose="020B0606030504020204" pitchFamily="34" charset="0"/>
+              </a:rPr>
+              <a:t>Output</a:t>
+            </a:r>
+          </a:p>
+        </p:txBody>
+      </p:sp>
+      <p:pic>
+        <p:nvPicPr>
+          <p:cNvPr id="15" name="Picture 14">
+            <a:extLst>
+              <a:ext uri="{FF2B5EF4-FFF2-40B4-BE49-F238E27FC236}">
+                <a16:creationId xmlns:a16="http://schemas.microsoft.com/office/drawing/2014/main" id="{9901E352-A3DE-4149-8C49-14A23D1B9EB6}"/>
+              </a:ext>
+            </a:extLst>
+          </p:cNvPr>
+          <p:cNvPicPr>
+            <a:picLocks noChangeAspect="1"/>
+          </p:cNvPicPr>
+          <p:nvPr/>
+        </p:nvPicPr>
+        <p:blipFill rotWithShape="1">
+          <a:blip r:embed="rId5">
+            <a:extLst>
+              <a:ext uri="{BEBA8EAE-BF5A-486C-A8C5-ECC9F3942E4B}">
+                <a14:imgProps xmlns:a14="http://schemas.microsoft.com/office/drawing/2010/main">
+                  <a14:imgLayer r:embed="rId6">
+                    <a14:imgEffect>
+                      <a14:backgroundRemoval t="10000" b="90000" l="10000" r="90000"/>
+                    </a14:imgEffect>
+                    <a14:imgEffect>
+                      <a14:brightnessContrast bright="-20000" contrast="40000"/>
+                    </a14:imgEffect>
+                  </a14:imgLayer>
+                </a14:imgProps>
+              </a:ext>
+            </a:extLst>
+          </a:blip>
+          <a:srcRect l="39446" t="38160" r="41230" b="36519"/>
+          <a:stretch/>
+        </p:blipFill>
+        <p:spPr>
+          <a:xfrm>
+            <a:off x="15011616" y="4064662"/>
+            <a:ext cx="4201795" cy="3422861"/>
+          </a:xfrm>
+          <a:prstGeom prst="rect">
+            <a:avLst/>
+          </a:prstGeom>
+        </p:spPr>
+      </p:pic>
+      <p:pic>
+        <p:nvPicPr>
+          <p:cNvPr id="16" name="Picture 15">
+            <a:extLst>
+              <a:ext uri="{FF2B5EF4-FFF2-40B4-BE49-F238E27FC236}">
+                <a16:creationId xmlns:a16="http://schemas.microsoft.com/office/drawing/2014/main" id="{5311D27C-A98C-894F-88F3-E94EFCD395FF}"/>
+              </a:ext>
+            </a:extLst>
+          </p:cNvPr>
+          <p:cNvPicPr>
+            <a:picLocks noChangeAspect="1"/>
+          </p:cNvPicPr>
+          <p:nvPr/>
+        </p:nvPicPr>
+        <p:blipFill rotWithShape="1">
+          <a:blip r:embed="rId7">
+            <a:extLst>
+              <a:ext uri="{BEBA8EAE-BF5A-486C-A8C5-ECC9F3942E4B}">
+                <a14:imgProps xmlns:a14="http://schemas.microsoft.com/office/drawing/2010/main">
+                  <a14:imgLayer>
+                    <a14:imgEffect>
+                      <a14:backgroundRemoval t="9695" b="92521" l="10000" r="98485"/>
+                    </a14:imgEffect>
+                    <a14:imgEffect>
+                      <a14:brightnessContrast bright="40000" contrast="40000"/>
+                    </a14:imgEffect>
+                  </a14:imgLayer>
+                </a14:imgProps>
+              </a:ext>
+            </a:extLst>
+          </a:blip>
+          <a:srcRect t="8313"/>
+          <a:stretch/>
+        </p:blipFill>
+        <p:spPr>
+          <a:xfrm>
+            <a:off x="15160182" y="1286147"/>
+            <a:ext cx="4201795" cy="4214405"/>
+          </a:xfrm>
+          <a:prstGeom prst="rect">
+            <a:avLst/>
+          </a:prstGeom>
+        </p:spPr>
+      </p:pic>
+    </p:spTree>
+    <p:extLst>
+      <p:ext uri="{BB962C8B-B14F-4D97-AF65-F5344CB8AC3E}">
+        <p14:creationId xmlns:p14="http://schemas.microsoft.com/office/powerpoint/2010/main" val="1965690932"/>
+      </p:ext>
+    </p:extLst>
+  </p:cSld>
+  <p:clrMapOvr>
+    <a:masterClrMapping/>
+  </p:clrMapOvr>
+</p:sld>
+</file>
+
+<file path=ppt/slides/slide2.xml><?xml version="1.0" encoding="utf-8"?>
+<p:sld xmlns:a="http://schemas.openxmlformats.org/drawingml/2006/main" xmlns:r="http://schemas.openxmlformats.org/officeDocument/2006/relationships" xmlns:p="http://schemas.openxmlformats.org/presentationml/2006/main">
+  <p:cSld>
+    <p:spTree>
+      <p:nvGrpSpPr>
+        <p:cNvPr id="1" name=""/>
+        <p:cNvGrpSpPr/>
+        <p:nvPr/>
+      </p:nvGrpSpPr>
+      <p:grpSpPr>
+        <a:xfrm>
+          <a:off x="0" y="0"/>
+          <a:ext cx="0" cy="0"/>
+          <a:chOff x="0" y="0"/>
+          <a:chExt cx="0" cy="0"/>
+        </a:xfrm>
+      </p:grpSpPr>
+      <p:sp>
+        <p:nvSpPr>
           <p:cNvPr id="115" name="TextBox 114">
             <a:extLst>
               <a:ext uri="{FF2B5EF4-FFF2-40B4-BE49-F238E27FC236}">
@@ -3349,7 +3720,7 @@
     </p:spTree>
     <p:extLst>
       <p:ext uri="{BB962C8B-B14F-4D97-AF65-F5344CB8AC3E}">
-        <p14:creationId xmlns:p14="http://schemas.microsoft.com/office/powerpoint/2010/main" val="1965690932"/>
+        <p14:creationId xmlns:p14="http://schemas.microsoft.com/office/powerpoint/2010/main" val="3274747377"/>
       </p:ext>
     </p:extLst>
   </p:cSld>

</xml_diff>